<commit_message>
new Update - 4 NK-87
</commit_message>
<xml_diff>
--- a/AS-GPS & EMBS.pptx
+++ b/AS-GPS & EMBS.pptx
@@ -6,7 +6,8 @@
   </p:sldMasterIdLst>
   <p:sldIdLst>
     <p:sldId id="256" r:id="rId2"/>
-    <p:sldId id="257" r:id="rId3"/>
+    <p:sldId id="258" r:id="rId3"/>
+    <p:sldId id="257" r:id="rId4"/>
   </p:sldIdLst>
   <p:sldSz cx="9144000" cy="6858000" type="screen4x3"/>
   <p:notesSz cx="6858000" cy="9144000"/>
@@ -290,7 +291,7 @@
             <a:fld id="{1D8BD707-D9CF-40AE-B4C6-C98DA3205C09}" type="datetimeFigureOut">
               <a:rPr lang="en-US" smtClean="0"/>
               <a:pPr/>
-              <a:t>9/22/2020</a:t>
+              <a:t>9/25/2020</a:t>
             </a:fld>
             <a:endParaRPr lang="en-US"/>
           </a:p>
@@ -457,7 +458,7 @@
             <a:fld id="{1D8BD707-D9CF-40AE-B4C6-C98DA3205C09}" type="datetimeFigureOut">
               <a:rPr lang="en-US" smtClean="0"/>
               <a:pPr/>
-              <a:t>9/22/2020</a:t>
+              <a:t>9/25/2020</a:t>
             </a:fld>
             <a:endParaRPr lang="en-US"/>
           </a:p>
@@ -634,7 +635,7 @@
             <a:fld id="{1D8BD707-D9CF-40AE-B4C6-C98DA3205C09}" type="datetimeFigureOut">
               <a:rPr lang="en-US" smtClean="0"/>
               <a:pPr/>
-              <a:t>9/22/2020</a:t>
+              <a:t>9/25/2020</a:t>
             </a:fld>
             <a:endParaRPr lang="en-US"/>
           </a:p>
@@ -801,7 +802,7 @@
             <a:fld id="{1D8BD707-D9CF-40AE-B4C6-C98DA3205C09}" type="datetimeFigureOut">
               <a:rPr lang="en-US" smtClean="0"/>
               <a:pPr/>
-              <a:t>9/22/2020</a:t>
+              <a:t>9/25/2020</a:t>
             </a:fld>
             <a:endParaRPr lang="en-US"/>
           </a:p>
@@ -1044,7 +1045,7 @@
             <a:fld id="{1D8BD707-D9CF-40AE-B4C6-C98DA3205C09}" type="datetimeFigureOut">
               <a:rPr lang="en-US" smtClean="0"/>
               <a:pPr/>
-              <a:t>9/22/2020</a:t>
+              <a:t>9/25/2020</a:t>
             </a:fld>
             <a:endParaRPr lang="en-US"/>
           </a:p>
@@ -1329,7 +1330,7 @@
             <a:fld id="{1D8BD707-D9CF-40AE-B4C6-C98DA3205C09}" type="datetimeFigureOut">
               <a:rPr lang="en-US" smtClean="0"/>
               <a:pPr/>
-              <a:t>9/22/2020</a:t>
+              <a:t>9/25/2020</a:t>
             </a:fld>
             <a:endParaRPr lang="en-US"/>
           </a:p>
@@ -1748,7 +1749,7 @@
             <a:fld id="{1D8BD707-D9CF-40AE-B4C6-C98DA3205C09}" type="datetimeFigureOut">
               <a:rPr lang="en-US" smtClean="0"/>
               <a:pPr/>
-              <a:t>9/22/2020</a:t>
+              <a:t>9/25/2020</a:t>
             </a:fld>
             <a:endParaRPr lang="en-US"/>
           </a:p>
@@ -1863,7 +1864,7 @@
             <a:fld id="{1D8BD707-D9CF-40AE-B4C6-C98DA3205C09}" type="datetimeFigureOut">
               <a:rPr lang="en-US" smtClean="0"/>
               <a:pPr/>
-              <a:t>9/22/2020</a:t>
+              <a:t>9/25/2020</a:t>
             </a:fld>
             <a:endParaRPr lang="en-US"/>
           </a:p>
@@ -1955,7 +1956,7 @@
             <a:fld id="{1D8BD707-D9CF-40AE-B4C6-C98DA3205C09}" type="datetimeFigureOut">
               <a:rPr lang="en-US" smtClean="0"/>
               <a:pPr/>
-              <a:t>9/22/2020</a:t>
+              <a:t>9/25/2020</a:t>
             </a:fld>
             <a:endParaRPr lang="en-US"/>
           </a:p>
@@ -2229,7 +2230,7 @@
             <a:fld id="{1D8BD707-D9CF-40AE-B4C6-C98DA3205C09}" type="datetimeFigureOut">
               <a:rPr lang="en-US" smtClean="0"/>
               <a:pPr/>
-              <a:t>9/22/2020</a:t>
+              <a:t>9/25/2020</a:t>
             </a:fld>
             <a:endParaRPr lang="en-US"/>
           </a:p>
@@ -2479,7 +2480,7 @@
             <a:fld id="{1D8BD707-D9CF-40AE-B4C6-C98DA3205C09}" type="datetimeFigureOut">
               <a:rPr lang="en-US" smtClean="0"/>
               <a:pPr/>
-              <a:t>9/22/2020</a:t>
+              <a:t>9/25/2020</a:t>
             </a:fld>
             <a:endParaRPr lang="en-US"/>
           </a:p>
@@ -2689,7 +2690,7 @@
             <a:fld id="{1D8BD707-D9CF-40AE-B4C6-C98DA3205C09}" type="datetimeFigureOut">
               <a:rPr lang="en-US" smtClean="0"/>
               <a:pPr/>
-              <a:t>9/22/2020</a:t>
+              <a:t>9/25/2020</a:t>
             </a:fld>
             <a:endParaRPr lang="en-US"/>
           </a:p>
@@ -3060,6 +3061,34 @@
           <a:chExt cx="0" cy="0"/>
         </a:xfrm>
       </p:grpSpPr>
+      <p:pic>
+        <p:nvPicPr>
+          <p:cNvPr id="4098" name="Picture 2" descr="C:\Users\syed\Desktop\GITHUB\Advance-Smart-GPS-Electromagnetic-Brake-System\IMAGE\anatomic-blue-and-pink-template-powerpoint-backgrounds.jpg"/>
+          <p:cNvPicPr>
+            <a:picLocks noChangeAspect="1" noChangeArrowheads="1"/>
+          </p:cNvPicPr>
+          <p:nvPr/>
+        </p:nvPicPr>
+        <p:blipFill>
+          <a:blip r:embed="rId2" cstate="print">
+            <a:lum bright="10000"/>
+          </a:blip>
+          <a:srcRect/>
+          <a:stretch>
+            <a:fillRect/>
+          </a:stretch>
+        </p:blipFill>
+        <p:spPr bwMode="auto">
+          <a:xfrm>
+            <a:off x="0" y="0"/>
+            <a:ext cx="9144000" cy="6858000"/>
+          </a:xfrm>
+          <a:prstGeom prst="rect">
+            <a:avLst/>
+          </a:prstGeom>
+          <a:noFill/>
+        </p:spPr>
+      </p:pic>
       <p:grpSp>
         <p:nvGrpSpPr>
           <p:cNvPr id="37" name="Group 36"/>
@@ -3068,13 +3097,13 @@
         </p:nvGrpSpPr>
         <p:grpSpPr>
           <a:xfrm>
-            <a:off x="609600" y="609600"/>
+            <a:off x="609600" y="1600200"/>
             <a:ext cx="8001000" cy="3429000"/>
             <a:chOff x="609600" y="228600"/>
             <a:chExt cx="8001000" cy="3429000"/>
           </a:xfrm>
           <a:blipFill dpi="0" rotWithShape="1">
-            <a:blip r:embed="rId2"/>
+            <a:blip r:embed="rId3"/>
             <a:srcRect/>
             <a:stretch>
               <a:fillRect/>
@@ -4172,7 +4201,7 @@
         </p:nvSpPr>
         <p:spPr>
           <a:xfrm>
-            <a:off x="685800" y="1600200"/>
+            <a:off x="685800" y="2590800"/>
             <a:ext cx="7772400" cy="1470025"/>
           </a:xfrm>
           <a:effectLst>
@@ -4229,206 +4258,6 @@
               </a:effectLst>
               <a:latin typeface="Russo One" pitchFamily="2" charset="0"/>
             </a:endParaRPr>
-          </a:p>
-        </p:txBody>
-      </p:sp>
-      <p:sp>
-        <p:nvSpPr>
-          <p:cNvPr id="3" name="Subtitle 2"/>
-          <p:cNvSpPr>
-            <a:spLocks noGrp="1"/>
-          </p:cNvSpPr>
-          <p:nvPr>
-            <p:ph type="subTitle" idx="1"/>
-          </p:nvPr>
-        </p:nvSpPr>
-        <p:spPr>
-          <a:xfrm>
-            <a:off x="1371600" y="4267200"/>
-            <a:ext cx="6400800" cy="1752600"/>
-          </a:xfrm>
-        </p:spPr>
-        <p:txBody>
-          <a:bodyPr>
-            <a:normAutofit lnSpcReduction="10000"/>
-          </a:bodyPr>
-          <a:lstStyle/>
-          <a:p>
-            <a:pPr algn="l"/>
-            <a:r>
-              <a:rPr lang="en-US" sz="1200" b="1" dirty="0" smtClean="0">
-                <a:solidFill>
-                  <a:schemeClr val="tx1"/>
-                </a:solidFill>
-                <a:latin typeface="SansSerif" pitchFamily="2" charset="2"/>
-              </a:rPr>
-              <a:t>SUBMITTED BY :</a:t>
-            </a:r>
-          </a:p>
-          <a:p>
-            <a:pPr algn="l"/>
-            <a:r>
-              <a:rPr lang="en-US" sz="1200" b="1" dirty="0" smtClean="0">
-                <a:solidFill>
-                  <a:schemeClr val="tx1"/>
-                </a:solidFill>
-                <a:latin typeface="SansSerif" pitchFamily="2" charset="2"/>
-              </a:rPr>
-              <a:t>	1. M. Syed Nihaal Ahmed </a:t>
-            </a:r>
-            <a:r>
-              <a:rPr lang="en-US" sz="1200" b="1" dirty="0" smtClean="0">
-                <a:solidFill>
-                  <a:schemeClr val="tx1">
-                    <a:lumMod val="65000"/>
-                    <a:lumOff val="35000"/>
-                  </a:schemeClr>
-                </a:solidFill>
-                <a:latin typeface="SansSerif" pitchFamily="2" charset="2"/>
-              </a:rPr>
-              <a:t>(17607231) [CEO/FOUNDER - Dread Eye Studio]</a:t>
-            </a:r>
-          </a:p>
-          <a:p>
-            <a:pPr algn="l"/>
-            <a:r>
-              <a:rPr lang="en-US" sz="1200" b="1" dirty="0" smtClean="0">
-                <a:solidFill>
-                  <a:schemeClr val="tx1">
-                    <a:lumMod val="65000"/>
-                    <a:lumOff val="35000"/>
-                  </a:schemeClr>
-                </a:solidFill>
-                <a:latin typeface="SansSerif" pitchFamily="2" charset="2"/>
-              </a:rPr>
-              <a:t>	</a:t>
-            </a:r>
-            <a:r>
-              <a:rPr lang="en-US" sz="1200" b="1" dirty="0" smtClean="0">
-                <a:solidFill>
-                  <a:schemeClr val="tx1"/>
-                </a:solidFill>
-                <a:latin typeface="SansSerif" pitchFamily="2" charset="2"/>
-              </a:rPr>
-              <a:t>2. T. Rakest </a:t>
-            </a:r>
-            <a:r>
-              <a:rPr lang="en-US" sz="1200" b="1" dirty="0" smtClean="0">
-                <a:solidFill>
-                  <a:schemeClr val="tx1">
-                    <a:lumMod val="65000"/>
-                    <a:lumOff val="35000"/>
-                  </a:schemeClr>
-                </a:solidFill>
-                <a:latin typeface="SansSerif" pitchFamily="2" charset="2"/>
-              </a:rPr>
-              <a:t>(16604252)</a:t>
-            </a:r>
-          </a:p>
-          <a:p>
-            <a:pPr algn="l"/>
-            <a:r>
-              <a:rPr lang="en-US" sz="1200" b="1" dirty="0" smtClean="0">
-                <a:solidFill>
-                  <a:schemeClr val="tx1"/>
-                </a:solidFill>
-                <a:latin typeface="SansSerif" pitchFamily="2" charset="2"/>
-              </a:rPr>
-              <a:t>	3. S.Sarath </a:t>
-            </a:r>
-            <a:r>
-              <a:rPr lang="en-US" sz="1200" b="1" dirty="0" smtClean="0">
-                <a:solidFill>
-                  <a:schemeClr val="tx1">
-                    <a:lumMod val="65000"/>
-                    <a:lumOff val="35000"/>
-                  </a:schemeClr>
-                </a:solidFill>
-                <a:latin typeface="SansSerif" pitchFamily="2" charset="2"/>
-              </a:rPr>
-              <a:t>(170604233)</a:t>
-            </a:r>
-          </a:p>
-          <a:p>
-            <a:pPr algn="l"/>
-            <a:r>
-              <a:rPr lang="en-US" sz="1200" b="1" dirty="0" smtClean="0">
-                <a:solidFill>
-                  <a:schemeClr val="tx1">
-                    <a:lumMod val="65000"/>
-                    <a:lumOff val="35000"/>
-                  </a:schemeClr>
-                </a:solidFill>
-                <a:latin typeface="SansSerif" pitchFamily="2" charset="2"/>
-              </a:rPr>
-              <a:t>	</a:t>
-            </a:r>
-            <a:r>
-              <a:rPr lang="en-US" sz="1200" b="1" dirty="0" smtClean="0">
-                <a:solidFill>
-                  <a:schemeClr val="tx1"/>
-                </a:solidFill>
-                <a:latin typeface="SansSerif" pitchFamily="2" charset="2"/>
-              </a:rPr>
-              <a:t>4. A. Syed Dastageer</a:t>
-            </a:r>
-            <a:r>
-              <a:rPr lang="en-US" sz="1200" b="1" dirty="0" smtClean="0">
-                <a:solidFill>
-                  <a:schemeClr val="tx1">
-                    <a:lumMod val="65000"/>
-                    <a:lumOff val="35000"/>
-                  </a:schemeClr>
-                </a:solidFill>
-                <a:latin typeface="SansSerif" pitchFamily="2" charset="2"/>
-              </a:rPr>
-              <a:t> (17604248)</a:t>
-            </a:r>
-          </a:p>
-          <a:p>
-            <a:pPr algn="l"/>
-            <a:endParaRPr lang="en-US" sz="1200" b="1" dirty="0" smtClean="0">
-              <a:solidFill>
-                <a:schemeClr val="tx1"/>
-              </a:solidFill>
-              <a:latin typeface="SansSerif" pitchFamily="2" charset="2"/>
-            </a:endParaRPr>
-          </a:p>
-          <a:p>
-            <a:pPr algn="l"/>
-            <a:r>
-              <a:rPr lang="en-US" sz="1200" b="1" dirty="0" smtClean="0">
-                <a:solidFill>
-                  <a:schemeClr val="tx1"/>
-                </a:solidFill>
-                <a:latin typeface="SansSerif" pitchFamily="2" charset="2"/>
-              </a:rPr>
-              <a:t>GUIDED BY:</a:t>
-            </a:r>
-          </a:p>
-          <a:p>
-            <a:pPr algn="l"/>
-            <a:r>
-              <a:rPr lang="en-US" sz="1200" b="1" dirty="0" smtClean="0">
-                <a:solidFill>
-                  <a:schemeClr val="tx1"/>
-                </a:solidFill>
-                <a:latin typeface="SansSerif" pitchFamily="2" charset="2"/>
-              </a:rPr>
-              <a:t>	Dr. S. Sivaganesan </a:t>
-            </a:r>
-            <a:r>
-              <a:rPr lang="en-US" sz="1200" b="1" dirty="0" smtClean="0">
-                <a:solidFill>
-                  <a:schemeClr val="tx1">
-                    <a:lumMod val="65000"/>
-                    <a:lumOff val="35000"/>
-                  </a:schemeClr>
-                </a:solidFill>
-                <a:latin typeface="SansSerif" pitchFamily="2" charset="2"/>
-              </a:rPr>
-              <a:t>(Ass. HOD)</a:t>
-            </a:r>
           </a:p>
         </p:txBody>
       </p:sp>
@@ -4467,6 +4296,419 @@
           <a:chExt cx="0" cy="0"/>
         </a:xfrm>
       </p:grpSpPr>
+      <p:pic>
+        <p:nvPicPr>
+          <p:cNvPr id="3074" name="Picture 2" descr="C:\Users\syed\Desktop\GITHUB\Advance-Smart-GPS-Electromagnetic-Brake-System\IMAGE\anatomic-blue-and-pink-template-powerpoint-backgrounds.jpg"/>
+          <p:cNvPicPr>
+            <a:picLocks noChangeAspect="1" noChangeArrowheads="1"/>
+          </p:cNvPicPr>
+          <p:nvPr/>
+        </p:nvPicPr>
+        <p:blipFill>
+          <a:blip r:embed="rId2" cstate="print">
+            <a:lum bright="10000"/>
+          </a:blip>
+          <a:srcRect/>
+          <a:stretch>
+            <a:fillRect/>
+          </a:stretch>
+        </p:blipFill>
+        <p:spPr bwMode="auto">
+          <a:xfrm>
+            <a:off x="0" y="0"/>
+            <a:ext cx="9144000" cy="6858000"/>
+          </a:xfrm>
+          <a:prstGeom prst="rect">
+            <a:avLst/>
+          </a:prstGeom>
+          <a:noFill/>
+        </p:spPr>
+      </p:pic>
+      <p:sp>
+        <p:nvSpPr>
+          <p:cNvPr id="3" name="Content Placeholder 2"/>
+          <p:cNvSpPr>
+            <a:spLocks noGrp="1"/>
+          </p:cNvSpPr>
+          <p:nvPr>
+            <p:ph idx="1"/>
+          </p:nvPr>
+        </p:nvSpPr>
+        <p:spPr>
+          <a:xfrm>
+            <a:off x="457200" y="1905000"/>
+            <a:ext cx="8229600" cy="2514600"/>
+          </a:xfrm>
+        </p:spPr>
+        <p:txBody>
+          <a:bodyPr>
+            <a:normAutofit/>
+          </a:bodyPr>
+          <a:lstStyle/>
+          <a:p>
+            <a:pPr>
+              <a:buNone/>
+            </a:pPr>
+            <a:r>
+              <a:rPr lang="en-US" sz="1600" b="1" dirty="0" smtClean="0">
+                <a:solidFill>
+                  <a:schemeClr val="accent6">
+                    <a:lumMod val="60000"/>
+                    <a:lumOff val="40000"/>
+                  </a:schemeClr>
+                </a:solidFill>
+                <a:latin typeface="Russo One" pitchFamily="2" charset="0"/>
+              </a:rPr>
+              <a:t>	TEAM MEMBER </a:t>
+            </a:r>
+            <a:r>
+              <a:rPr lang="en-US" sz="1600" b="1" dirty="0" smtClean="0">
+                <a:solidFill>
+                  <a:schemeClr val="accent6">
+                    <a:lumMod val="60000"/>
+                    <a:lumOff val="40000"/>
+                  </a:schemeClr>
+                </a:solidFill>
+                <a:latin typeface="Russo One" pitchFamily="2" charset="0"/>
+              </a:rPr>
+              <a:t>:</a:t>
+            </a:r>
+          </a:p>
+          <a:p>
+            <a:pPr>
+              <a:buNone/>
+            </a:pPr>
+            <a:r>
+              <a:rPr lang="en-US" sz="1600" b="1" dirty="0" smtClean="0">
+                <a:latin typeface="SansSerif" pitchFamily="2" charset="2"/>
+              </a:rPr>
+              <a:t>	</a:t>
+            </a:r>
+            <a:r>
+              <a:rPr lang="en-US" sz="1600" b="1" dirty="0" smtClean="0">
+                <a:latin typeface="SansSerif" pitchFamily="2" charset="2"/>
+              </a:rPr>
+              <a:t>	</a:t>
+            </a:r>
+            <a:r>
+              <a:rPr lang="en-US" sz="1600" b="1" dirty="0" smtClean="0">
+                <a:solidFill>
+                  <a:schemeClr val="tx2">
+                    <a:lumMod val="50000"/>
+                  </a:schemeClr>
+                </a:solidFill>
+                <a:latin typeface="SansSerif" pitchFamily="2" charset="2"/>
+              </a:rPr>
+              <a:t>1. M. Syed Nihaal Ahmed </a:t>
+            </a:r>
+            <a:r>
+              <a:rPr lang="en-US" sz="1600" b="1" dirty="0" smtClean="0">
+                <a:solidFill>
+                  <a:schemeClr val="tx1">
+                    <a:lumMod val="65000"/>
+                    <a:lumOff val="35000"/>
+                  </a:schemeClr>
+                </a:solidFill>
+                <a:latin typeface="SansSerif" pitchFamily="2" charset="2"/>
+              </a:rPr>
+              <a:t>(17607231) [CEO/FOUNDER - Dread Eye Studio]</a:t>
+            </a:r>
+          </a:p>
+          <a:p>
+            <a:pPr>
+              <a:buNone/>
+            </a:pPr>
+            <a:r>
+              <a:rPr lang="en-US" sz="1600" b="1" dirty="0" smtClean="0">
+                <a:solidFill>
+                  <a:schemeClr val="tx1">
+                    <a:lumMod val="65000"/>
+                    <a:lumOff val="35000"/>
+                  </a:schemeClr>
+                </a:solidFill>
+                <a:latin typeface="SansSerif" pitchFamily="2" charset="2"/>
+              </a:rPr>
+              <a:t>	</a:t>
+            </a:r>
+            <a:r>
+              <a:rPr lang="en-US" sz="1600" b="1" dirty="0" smtClean="0">
+                <a:solidFill>
+                  <a:schemeClr val="tx1">
+                    <a:lumMod val="65000"/>
+                    <a:lumOff val="35000"/>
+                  </a:schemeClr>
+                </a:solidFill>
+                <a:latin typeface="SansSerif" pitchFamily="2" charset="2"/>
+              </a:rPr>
+              <a:t>	</a:t>
+            </a:r>
+            <a:r>
+              <a:rPr lang="en-US" sz="1600" b="1" dirty="0" smtClean="0">
+                <a:solidFill>
+                  <a:schemeClr val="tx2">
+                    <a:lumMod val="50000"/>
+                  </a:schemeClr>
+                </a:solidFill>
+                <a:latin typeface="SansSerif" pitchFamily="2" charset="2"/>
+              </a:rPr>
+              <a:t>2. T. Rakest </a:t>
+            </a:r>
+            <a:r>
+              <a:rPr lang="en-US" sz="1600" b="1" dirty="0" smtClean="0">
+                <a:solidFill>
+                  <a:schemeClr val="tx1">
+                    <a:lumMod val="65000"/>
+                    <a:lumOff val="35000"/>
+                  </a:schemeClr>
+                </a:solidFill>
+                <a:latin typeface="SansSerif" pitchFamily="2" charset="2"/>
+              </a:rPr>
+              <a:t>(16604252)</a:t>
+            </a:r>
+          </a:p>
+          <a:p>
+            <a:pPr>
+              <a:buNone/>
+            </a:pPr>
+            <a:r>
+              <a:rPr lang="en-US" sz="1600" b="1" dirty="0" smtClean="0">
+                <a:latin typeface="SansSerif" pitchFamily="2" charset="2"/>
+              </a:rPr>
+              <a:t>		</a:t>
+            </a:r>
+            <a:r>
+              <a:rPr lang="en-US" sz="1600" b="1" dirty="0" smtClean="0">
+                <a:solidFill>
+                  <a:schemeClr val="tx2">
+                    <a:lumMod val="50000"/>
+                  </a:schemeClr>
+                </a:solidFill>
+                <a:latin typeface="SansSerif" pitchFamily="2" charset="2"/>
+              </a:rPr>
+              <a:t>3. S. Sarath </a:t>
+            </a:r>
+            <a:r>
+              <a:rPr lang="en-US" sz="1600" b="1" dirty="0" smtClean="0">
+                <a:solidFill>
+                  <a:schemeClr val="tx1">
+                    <a:lumMod val="65000"/>
+                    <a:lumOff val="35000"/>
+                  </a:schemeClr>
+                </a:solidFill>
+                <a:latin typeface="SansSerif" pitchFamily="2" charset="2"/>
+              </a:rPr>
+              <a:t>(170604233)</a:t>
+            </a:r>
+          </a:p>
+          <a:p>
+            <a:pPr>
+              <a:buNone/>
+            </a:pPr>
+            <a:r>
+              <a:rPr lang="en-US" sz="1600" b="1" dirty="0" smtClean="0">
+                <a:solidFill>
+                  <a:schemeClr val="tx1">
+                    <a:lumMod val="65000"/>
+                    <a:lumOff val="35000"/>
+                  </a:schemeClr>
+                </a:solidFill>
+                <a:latin typeface="SansSerif" pitchFamily="2" charset="2"/>
+              </a:rPr>
+              <a:t>	</a:t>
+            </a:r>
+            <a:r>
+              <a:rPr lang="en-US" sz="1600" b="1" dirty="0" smtClean="0">
+                <a:solidFill>
+                  <a:schemeClr val="tx1">
+                    <a:lumMod val="65000"/>
+                    <a:lumOff val="35000"/>
+                  </a:schemeClr>
+                </a:solidFill>
+                <a:latin typeface="SansSerif" pitchFamily="2" charset="2"/>
+              </a:rPr>
+              <a:t>	</a:t>
+            </a:r>
+            <a:r>
+              <a:rPr lang="en-US" sz="1600" b="1" dirty="0" smtClean="0">
+                <a:solidFill>
+                  <a:schemeClr val="tx2">
+                    <a:lumMod val="50000"/>
+                  </a:schemeClr>
+                </a:solidFill>
+                <a:latin typeface="SansSerif" pitchFamily="2" charset="2"/>
+              </a:rPr>
+              <a:t>4. A. Syed Dastageer </a:t>
+            </a:r>
+            <a:r>
+              <a:rPr lang="en-US" sz="1600" b="1" dirty="0" smtClean="0">
+                <a:solidFill>
+                  <a:schemeClr val="tx1">
+                    <a:lumMod val="65000"/>
+                    <a:lumOff val="35000"/>
+                  </a:schemeClr>
+                </a:solidFill>
+                <a:latin typeface="SansSerif" pitchFamily="2" charset="2"/>
+              </a:rPr>
+              <a:t>(17604248)</a:t>
+            </a:r>
+          </a:p>
+          <a:p>
+            <a:pPr>
+              <a:buNone/>
+            </a:pPr>
+            <a:endParaRPr lang="en-US" sz="1600" b="1" dirty="0" smtClean="0">
+              <a:latin typeface="SansSerif" pitchFamily="2" charset="2"/>
+            </a:endParaRPr>
+          </a:p>
+          <a:p>
+            <a:pPr>
+              <a:buNone/>
+            </a:pPr>
+            <a:r>
+              <a:rPr lang="en-US" sz="1600" b="1" dirty="0" smtClean="0">
+                <a:latin typeface="SansSerif" pitchFamily="2" charset="2"/>
+              </a:rPr>
+              <a:t>	</a:t>
+            </a:r>
+            <a:r>
+              <a:rPr lang="en-US" sz="1600" b="1" dirty="0" smtClean="0">
+                <a:solidFill>
+                  <a:schemeClr val="accent6">
+                    <a:lumMod val="60000"/>
+                    <a:lumOff val="40000"/>
+                  </a:schemeClr>
+                </a:solidFill>
+                <a:latin typeface="Russo One" pitchFamily="2" charset="0"/>
+              </a:rPr>
+              <a:t>GUIDED </a:t>
+            </a:r>
+            <a:r>
+              <a:rPr lang="en-US" sz="1600" b="1" dirty="0" smtClean="0">
+                <a:solidFill>
+                  <a:schemeClr val="accent6">
+                    <a:lumMod val="60000"/>
+                    <a:lumOff val="40000"/>
+                  </a:schemeClr>
+                </a:solidFill>
+                <a:latin typeface="Russo One" pitchFamily="2" charset="0"/>
+              </a:rPr>
+              <a:t>BY:</a:t>
+            </a:r>
+          </a:p>
+          <a:p>
+            <a:pPr>
+              <a:buNone/>
+            </a:pPr>
+            <a:r>
+              <a:rPr lang="en-US" sz="1600" b="1" dirty="0" smtClean="0">
+                <a:latin typeface="SansSerif" pitchFamily="2" charset="2"/>
+              </a:rPr>
+              <a:t>	</a:t>
+            </a:r>
+            <a:r>
+              <a:rPr lang="en-US" sz="1600" b="1" dirty="0" smtClean="0">
+                <a:latin typeface="SansSerif" pitchFamily="2" charset="2"/>
+              </a:rPr>
+              <a:t>	</a:t>
+            </a:r>
+            <a:r>
+              <a:rPr lang="en-US" sz="1600" b="1" dirty="0" smtClean="0">
+                <a:solidFill>
+                  <a:schemeClr val="tx2">
+                    <a:lumMod val="50000"/>
+                  </a:schemeClr>
+                </a:solidFill>
+                <a:latin typeface="SansSerif" pitchFamily="2" charset="2"/>
+              </a:rPr>
+              <a:t>Dr. S. Sivaganesan </a:t>
+            </a:r>
+            <a:r>
+              <a:rPr lang="en-US" sz="1600" b="1" dirty="0" smtClean="0">
+                <a:solidFill>
+                  <a:schemeClr val="tx1">
+                    <a:lumMod val="65000"/>
+                    <a:lumOff val="35000"/>
+                  </a:schemeClr>
+                </a:solidFill>
+                <a:latin typeface="SansSerif" pitchFamily="2" charset="2"/>
+              </a:rPr>
+              <a:t>(Ass. HOD)</a:t>
+            </a:r>
+          </a:p>
+          <a:p>
+            <a:pPr>
+              <a:buNone/>
+            </a:pPr>
+            <a:endParaRPr lang="en-US" sz="1200" dirty="0"/>
+          </a:p>
+        </p:txBody>
+      </p:sp>
+    </p:spTree>
+  </p:cSld>
+  <p:clrMapOvr>
+    <a:masterClrMapping/>
+  </p:clrMapOvr>
+  <p:transition>
+    <p:wheel spokes="8"/>
+  </p:transition>
+  <p:timing>
+    <p:tnLst>
+      <p:par>
+        <p:cTn id="1" dur="indefinite" restart="never" nodeType="tmRoot"/>
+      </p:par>
+    </p:tnLst>
+  </p:timing>
+</p:sld>
+</file>
+
+<file path=ppt/slides/slide3.xml><?xml version="1.0" encoding="utf-8"?>
+<p:sld xmlns:a="http://schemas.openxmlformats.org/drawingml/2006/main" xmlns:r="http://schemas.openxmlformats.org/officeDocument/2006/relationships" xmlns:p="http://schemas.openxmlformats.org/presentationml/2006/main">
+  <p:cSld>
+    <p:spTree>
+      <p:nvGrpSpPr>
+        <p:cNvPr id="1" name=""/>
+        <p:cNvGrpSpPr/>
+        <p:nvPr/>
+      </p:nvGrpSpPr>
+      <p:grpSpPr>
+        <a:xfrm>
+          <a:off x="0" y="0"/>
+          <a:ext cx="0" cy="0"/>
+          <a:chOff x="0" y="0"/>
+          <a:chExt cx="0" cy="0"/>
+        </a:xfrm>
+      </p:grpSpPr>
+      <p:pic>
+        <p:nvPicPr>
+          <p:cNvPr id="2050" name="Picture 2" descr="C:\Users\syed\Desktop\GITHUB\Advance-Smart-GPS-Electromagnetic-Brake-System\IMAGE\anatomic-blue-and-pink-template-powerpoint-backgrounds.jpg"/>
+          <p:cNvPicPr>
+            <a:picLocks noChangeAspect="1" noChangeArrowheads="1"/>
+          </p:cNvPicPr>
+          <p:nvPr/>
+        </p:nvPicPr>
+        <p:blipFill>
+          <a:blip r:embed="rId2" cstate="print">
+            <a:lum bright="10000"/>
+          </a:blip>
+          <a:srcRect/>
+          <a:stretch>
+            <a:fillRect/>
+          </a:stretch>
+        </p:blipFill>
+        <p:spPr bwMode="auto">
+          <a:xfrm>
+            <a:off x="0" y="0"/>
+            <a:ext cx="9144000" cy="6858000"/>
+          </a:xfrm>
+          <a:prstGeom prst="rect">
+            <a:avLst/>
+          </a:prstGeom>
+          <a:noFill/>
+          <a:ln>
+            <a:noFill/>
+          </a:ln>
+        </p:spPr>
+      </p:pic>
       <p:sp>
         <p:nvSpPr>
           <p:cNvPr id="2" name="Title 1"/>
@@ -4492,12 +4734,36 @@
             <a:pPr algn="l"/>
             <a:r>
               <a:rPr lang="en-US" sz="2400" b="1" dirty="0" smtClean="0">
-                <a:latin typeface="SansSerif" pitchFamily="2" charset="2"/>
+                <a:solidFill>
+                  <a:schemeClr val="accent6">
+                    <a:lumMod val="60000"/>
+                    <a:lumOff val="40000"/>
+                  </a:schemeClr>
+                </a:solidFill>
+                <a:latin typeface="Russo One" pitchFamily="2" charset="0"/>
               </a:rPr>
-              <a:t>ABSTRACT :</a:t>
+              <a:t>ABSTRACT </a:t>
+            </a:r>
+            <a:r>
+              <a:rPr lang="en-US" sz="2400" b="1" dirty="0" smtClean="0">
+                <a:solidFill>
+                  <a:schemeClr val="accent6">
+                    <a:lumMod val="60000"/>
+                    <a:lumOff val="40000"/>
+                  </a:schemeClr>
+                </a:solidFill>
+                <a:latin typeface="Russo One" pitchFamily="2" charset="0"/>
+              </a:rPr>
+              <a:t>:</a:t>
             </a:r>
             <a:endParaRPr lang="en-US" sz="2400" dirty="0">
-              <a:latin typeface="SansSerif" pitchFamily="2" charset="2"/>
+              <a:solidFill>
+                <a:schemeClr val="accent6">
+                  <a:lumMod val="60000"/>
+                  <a:lumOff val="40000"/>
+                </a:schemeClr>
+              </a:solidFill>
+              <a:latin typeface="Russo One" pitchFamily="2" charset="0"/>
             </a:endParaRPr>
           </a:p>
         </p:txBody>
@@ -4617,7 +4883,7 @@
     <a:masterClrMapping/>
   </p:clrMapOvr>
   <p:transition>
-    <p:comb/>
+    <p:diamond/>
   </p:transition>
   <p:timing>
     <p:tnLst>

</xml_diff>

<commit_message>
Update - 4 NK-87
</commit_message>
<xml_diff>
--- a/AS-GPS & EMBS.pptx
+++ b/AS-GPS & EMBS.pptx
@@ -4342,7 +4342,7 @@
         </p:spPr>
         <p:txBody>
           <a:bodyPr>
-            <a:normAutofit/>
+            <a:noAutofit/>
           </a:bodyPr>
           <a:lstStyle/>
           <a:p>
@@ -4350,7 +4350,7 @@
               <a:buNone/>
             </a:pPr>
             <a:r>
-              <a:rPr lang="en-US" sz="1600" b="1" dirty="0" smtClean="0">
+              <a:rPr lang="en-US" sz="1800" b="1" dirty="0" smtClean="0">
                 <a:solidFill>
                   <a:schemeClr val="accent6">
                     <a:lumMod val="60000"/>
@@ -4359,10 +4359,177 @@
                 </a:solidFill>
                 <a:latin typeface="Russo One" pitchFamily="2" charset="0"/>
               </a:rPr>
-              <a:t>	TEAM MEMBER </a:t>
-            </a:r>
-            <a:r>
-              <a:rPr lang="en-US" sz="1600" b="1" dirty="0" smtClean="0">
+              <a:t>	TEAM MEMBER :</a:t>
+            </a:r>
+          </a:p>
+          <a:p>
+            <a:pPr>
+              <a:buNone/>
+            </a:pPr>
+            <a:r>
+              <a:rPr lang="en-US" sz="1800" b="1" dirty="0" smtClean="0">
+                <a:latin typeface="SansSerif" pitchFamily="2" charset="2"/>
+              </a:rPr>
+              <a:t>		</a:t>
+            </a:r>
+            <a:r>
+              <a:rPr lang="en-US" sz="1800" b="1" dirty="0" smtClean="0">
+                <a:solidFill>
+                  <a:schemeClr val="tx2">
+                    <a:lumMod val="50000"/>
+                  </a:schemeClr>
+                </a:solidFill>
+                <a:latin typeface="Rockwell Condensed" pitchFamily="18" charset="0"/>
+              </a:rPr>
+              <a:t>1. M. Syed Nihaal Ahmed </a:t>
+            </a:r>
+            <a:r>
+              <a:rPr lang="en-US" sz="1800" b="1" dirty="0" smtClean="0">
+                <a:solidFill>
+                  <a:schemeClr val="tx1">
+                    <a:lumMod val="65000"/>
+                    <a:lumOff val="35000"/>
+                  </a:schemeClr>
+                </a:solidFill>
+                <a:latin typeface="Rockwell Condensed" pitchFamily="18" charset="0"/>
+              </a:rPr>
+              <a:t>(17607231) [CEO/FOUNDER - Dread Eye Studio]</a:t>
+            </a:r>
+          </a:p>
+          <a:p>
+            <a:pPr>
+              <a:buNone/>
+            </a:pPr>
+            <a:r>
+              <a:rPr lang="en-US" sz="1800" b="1" dirty="0" smtClean="0">
+                <a:solidFill>
+                  <a:schemeClr val="tx1">
+                    <a:lumMod val="65000"/>
+                    <a:lumOff val="35000"/>
+                  </a:schemeClr>
+                </a:solidFill>
+                <a:latin typeface="Rockwell Condensed" pitchFamily="18" charset="0"/>
+              </a:rPr>
+              <a:t>		</a:t>
+            </a:r>
+            <a:r>
+              <a:rPr lang="en-US" sz="1800" b="1" dirty="0" smtClean="0">
+                <a:solidFill>
+                  <a:schemeClr val="tx2">
+                    <a:lumMod val="50000"/>
+                  </a:schemeClr>
+                </a:solidFill>
+                <a:latin typeface="Rockwell Condensed" pitchFamily="18" charset="0"/>
+              </a:rPr>
+              <a:t>2. T. Rakest </a:t>
+            </a:r>
+            <a:r>
+              <a:rPr lang="en-US" sz="1800" b="1" dirty="0" smtClean="0">
+                <a:solidFill>
+                  <a:schemeClr val="tx1">
+                    <a:lumMod val="65000"/>
+                    <a:lumOff val="35000"/>
+                  </a:schemeClr>
+                </a:solidFill>
+                <a:latin typeface="Rockwell Condensed" pitchFamily="18" charset="0"/>
+              </a:rPr>
+              <a:t>(16604252)</a:t>
+            </a:r>
+          </a:p>
+          <a:p>
+            <a:pPr>
+              <a:buNone/>
+            </a:pPr>
+            <a:r>
+              <a:rPr lang="en-US" sz="1800" b="1" dirty="0" smtClean="0">
+                <a:latin typeface="Rockwell Condensed" pitchFamily="18" charset="0"/>
+              </a:rPr>
+              <a:t>		</a:t>
+            </a:r>
+            <a:r>
+              <a:rPr lang="en-US" sz="1800" b="1" dirty="0" smtClean="0">
+                <a:solidFill>
+                  <a:schemeClr val="tx2">
+                    <a:lumMod val="50000"/>
+                  </a:schemeClr>
+                </a:solidFill>
+                <a:latin typeface="Rockwell Condensed" pitchFamily="18" charset="0"/>
+              </a:rPr>
+              <a:t>3. S. Sarath </a:t>
+            </a:r>
+            <a:r>
+              <a:rPr lang="en-US" sz="1800" b="1" dirty="0" smtClean="0">
+                <a:solidFill>
+                  <a:schemeClr val="tx1">
+                    <a:lumMod val="65000"/>
+                    <a:lumOff val="35000"/>
+                  </a:schemeClr>
+                </a:solidFill>
+                <a:latin typeface="Rockwell Condensed" pitchFamily="18" charset="0"/>
+              </a:rPr>
+              <a:t>(170604233)</a:t>
+            </a:r>
+          </a:p>
+          <a:p>
+            <a:pPr>
+              <a:buNone/>
+            </a:pPr>
+            <a:r>
+              <a:rPr lang="en-US" sz="1800" b="1" dirty="0" smtClean="0">
+                <a:solidFill>
+                  <a:schemeClr val="tx1">
+                    <a:lumMod val="65000"/>
+                    <a:lumOff val="35000"/>
+                  </a:schemeClr>
+                </a:solidFill>
+                <a:latin typeface="Rockwell Condensed" pitchFamily="18" charset="0"/>
+              </a:rPr>
+              <a:t>		</a:t>
+            </a:r>
+            <a:r>
+              <a:rPr lang="en-US" sz="1800" b="1" dirty="0" smtClean="0">
+                <a:solidFill>
+                  <a:schemeClr val="tx2">
+                    <a:lumMod val="50000"/>
+                  </a:schemeClr>
+                </a:solidFill>
+                <a:latin typeface="Rockwell Condensed" pitchFamily="18" charset="0"/>
+              </a:rPr>
+              <a:t>4. A. Syed Dastageer </a:t>
+            </a:r>
+            <a:r>
+              <a:rPr lang="en-US" sz="1800" b="1" dirty="0" smtClean="0">
+                <a:solidFill>
+                  <a:schemeClr val="tx1">
+                    <a:lumMod val="65000"/>
+                    <a:lumOff val="35000"/>
+                  </a:schemeClr>
+                </a:solidFill>
+                <a:latin typeface="Rockwell Condensed" pitchFamily="18" charset="0"/>
+              </a:rPr>
+              <a:t>(17604248)</a:t>
+            </a:r>
+          </a:p>
+          <a:p>
+            <a:pPr>
+              <a:buNone/>
+            </a:pPr>
+            <a:endParaRPr lang="en-US" sz="1800" b="1" dirty="0" smtClean="0">
+              <a:latin typeface="SansSerif" pitchFamily="2" charset="2"/>
+            </a:endParaRPr>
+          </a:p>
+          <a:p>
+            <a:pPr>
+              <a:buNone/>
+            </a:pPr>
+            <a:r>
+              <a:rPr lang="en-US" sz="1800" b="1" dirty="0" smtClean="0">
+                <a:latin typeface="SansSerif" pitchFamily="2" charset="2"/>
+              </a:rPr>
+              <a:t>	</a:t>
+            </a:r>
+            <a:r>
+              <a:rPr lang="en-US" sz="1800" b="1" dirty="0" smtClean="0">
                 <a:solidFill>
                   <a:schemeClr val="accent6">
                     <a:lumMod val="60000"/>
@@ -4371,7 +4538,7 @@
                 </a:solidFill>
                 <a:latin typeface="Russo One" pitchFamily="2" charset="0"/>
               </a:rPr>
-              <a:t>:</a:t>
+              <a:t>GUIDED BY:</a:t>
             </a:r>
           </a:p>
           <a:p>
@@ -4379,258 +4546,31 @@
               <a:buNone/>
             </a:pPr>
             <a:r>
-              <a:rPr lang="en-US" sz="1600" b="1" dirty="0" smtClean="0">
+              <a:rPr lang="en-US" sz="1800" b="1" dirty="0" smtClean="0">
                 <a:latin typeface="SansSerif" pitchFamily="2" charset="2"/>
               </a:rPr>
-              <a:t>	</a:t>
-            </a:r>
-            <a:r>
-              <a:rPr lang="en-US" sz="1600" b="1" dirty="0" smtClean="0">
-                <a:latin typeface="SansSerif" pitchFamily="2" charset="2"/>
-              </a:rPr>
-              <a:t>	</a:t>
-            </a:r>
-            <a:r>
-              <a:rPr lang="en-US" sz="1600" b="1" dirty="0" smtClean="0">
+              <a:t>		</a:t>
+            </a:r>
+            <a:r>
+              <a:rPr lang="en-US" sz="1800" b="1" dirty="0" smtClean="0">
                 <a:solidFill>
                   <a:schemeClr val="tx2">
                     <a:lumMod val="50000"/>
                   </a:schemeClr>
                 </a:solidFill>
-                <a:latin typeface="SansSerif" pitchFamily="2" charset="2"/>
+                <a:latin typeface="Rockwell Condensed" pitchFamily="18" charset="0"/>
               </a:rPr>
-              <a:t>1. M. Syed Nihaal Ahmed </a:t>
-            </a:r>
-            <a:r>
-              <a:rPr lang="en-US" sz="1600" b="1" dirty="0" smtClean="0">
+              <a:t>Dr. S. Sivaganesan </a:t>
+            </a:r>
+            <a:r>
+              <a:rPr lang="en-US" sz="1800" b="1" dirty="0" smtClean="0">
                 <a:solidFill>
                   <a:schemeClr val="tx1">
                     <a:lumMod val="65000"/>
                     <a:lumOff val="35000"/>
                   </a:schemeClr>
                 </a:solidFill>
-                <a:latin typeface="SansSerif" pitchFamily="2" charset="2"/>
-              </a:rPr>
-              <a:t>(17607231) [CEO/FOUNDER - Dread Eye Studio]</a:t>
-            </a:r>
-          </a:p>
-          <a:p>
-            <a:pPr>
-              <a:buNone/>
-            </a:pPr>
-            <a:r>
-              <a:rPr lang="en-US" sz="1600" b="1" dirty="0" smtClean="0">
-                <a:solidFill>
-                  <a:schemeClr val="tx1">
-                    <a:lumMod val="65000"/>
-                    <a:lumOff val="35000"/>
-                  </a:schemeClr>
-                </a:solidFill>
-                <a:latin typeface="SansSerif" pitchFamily="2" charset="2"/>
-              </a:rPr>
-              <a:t>	</a:t>
-            </a:r>
-            <a:r>
-              <a:rPr lang="en-US" sz="1600" b="1" dirty="0" smtClean="0">
-                <a:solidFill>
-                  <a:schemeClr val="tx1">
-                    <a:lumMod val="65000"/>
-                    <a:lumOff val="35000"/>
-                  </a:schemeClr>
-                </a:solidFill>
-                <a:latin typeface="SansSerif" pitchFamily="2" charset="2"/>
-              </a:rPr>
-              <a:t>	</a:t>
-            </a:r>
-            <a:r>
-              <a:rPr lang="en-US" sz="1600" b="1" dirty="0" smtClean="0">
-                <a:solidFill>
-                  <a:schemeClr val="tx2">
-                    <a:lumMod val="50000"/>
-                  </a:schemeClr>
-                </a:solidFill>
-                <a:latin typeface="SansSerif" pitchFamily="2" charset="2"/>
-              </a:rPr>
-              <a:t>2. T. Rakest </a:t>
-            </a:r>
-            <a:r>
-              <a:rPr lang="en-US" sz="1600" b="1" dirty="0" smtClean="0">
-                <a:solidFill>
-                  <a:schemeClr val="tx1">
-                    <a:lumMod val="65000"/>
-                    <a:lumOff val="35000"/>
-                  </a:schemeClr>
-                </a:solidFill>
-                <a:latin typeface="SansSerif" pitchFamily="2" charset="2"/>
-              </a:rPr>
-              <a:t>(16604252)</a:t>
-            </a:r>
-          </a:p>
-          <a:p>
-            <a:pPr>
-              <a:buNone/>
-            </a:pPr>
-            <a:r>
-              <a:rPr lang="en-US" sz="1600" b="1" dirty="0" smtClean="0">
-                <a:latin typeface="SansSerif" pitchFamily="2" charset="2"/>
-              </a:rPr>
-              <a:t>		</a:t>
-            </a:r>
-            <a:r>
-              <a:rPr lang="en-US" sz="1600" b="1" dirty="0" smtClean="0">
-                <a:solidFill>
-                  <a:schemeClr val="tx2">
-                    <a:lumMod val="50000"/>
-                  </a:schemeClr>
-                </a:solidFill>
-                <a:latin typeface="SansSerif" pitchFamily="2" charset="2"/>
-              </a:rPr>
-              <a:t>3. S. Sarath </a:t>
-            </a:r>
-            <a:r>
-              <a:rPr lang="en-US" sz="1600" b="1" dirty="0" smtClean="0">
-                <a:solidFill>
-                  <a:schemeClr val="tx1">
-                    <a:lumMod val="65000"/>
-                    <a:lumOff val="35000"/>
-                  </a:schemeClr>
-                </a:solidFill>
-                <a:latin typeface="SansSerif" pitchFamily="2" charset="2"/>
-              </a:rPr>
-              <a:t>(170604233)</a:t>
-            </a:r>
-          </a:p>
-          <a:p>
-            <a:pPr>
-              <a:buNone/>
-            </a:pPr>
-            <a:r>
-              <a:rPr lang="en-US" sz="1600" b="1" dirty="0" smtClean="0">
-                <a:solidFill>
-                  <a:schemeClr val="tx1">
-                    <a:lumMod val="65000"/>
-                    <a:lumOff val="35000"/>
-                  </a:schemeClr>
-                </a:solidFill>
-                <a:latin typeface="SansSerif" pitchFamily="2" charset="2"/>
-              </a:rPr>
-              <a:t>	</a:t>
-            </a:r>
-            <a:r>
-              <a:rPr lang="en-US" sz="1600" b="1" dirty="0" smtClean="0">
-                <a:solidFill>
-                  <a:schemeClr val="tx1">
-                    <a:lumMod val="65000"/>
-                    <a:lumOff val="35000"/>
-                  </a:schemeClr>
-                </a:solidFill>
-                <a:latin typeface="SansSerif" pitchFamily="2" charset="2"/>
-              </a:rPr>
-              <a:t>	</a:t>
-            </a:r>
-            <a:r>
-              <a:rPr lang="en-US" sz="1600" b="1" dirty="0" smtClean="0">
-                <a:solidFill>
-                  <a:schemeClr val="tx2">
-                    <a:lumMod val="50000"/>
-                  </a:schemeClr>
-                </a:solidFill>
-                <a:latin typeface="SansSerif" pitchFamily="2" charset="2"/>
-              </a:rPr>
-              <a:t>4. A. Syed Dastageer </a:t>
-            </a:r>
-            <a:r>
-              <a:rPr lang="en-US" sz="1600" b="1" dirty="0" smtClean="0">
-                <a:solidFill>
-                  <a:schemeClr val="tx1">
-                    <a:lumMod val="65000"/>
-                    <a:lumOff val="35000"/>
-                  </a:schemeClr>
-                </a:solidFill>
-                <a:latin typeface="SansSerif" pitchFamily="2" charset="2"/>
-              </a:rPr>
-              <a:t>(17604248)</a:t>
-            </a:r>
-          </a:p>
-          <a:p>
-            <a:pPr>
-              <a:buNone/>
-            </a:pPr>
-            <a:endParaRPr lang="en-US" sz="1600" b="1" dirty="0" smtClean="0">
-              <a:latin typeface="SansSerif" pitchFamily="2" charset="2"/>
-            </a:endParaRPr>
-          </a:p>
-          <a:p>
-            <a:pPr>
-              <a:buNone/>
-            </a:pPr>
-            <a:r>
-              <a:rPr lang="en-US" sz="1600" b="1" dirty="0" smtClean="0">
-                <a:latin typeface="SansSerif" pitchFamily="2" charset="2"/>
-              </a:rPr>
-              <a:t>	</a:t>
-            </a:r>
-            <a:r>
-              <a:rPr lang="en-US" sz="1600" b="1" dirty="0" smtClean="0">
-                <a:solidFill>
-                  <a:schemeClr val="accent6">
-                    <a:lumMod val="60000"/>
-                    <a:lumOff val="40000"/>
-                  </a:schemeClr>
-                </a:solidFill>
-                <a:latin typeface="Russo One" pitchFamily="2" charset="0"/>
-              </a:rPr>
-              <a:t>GUIDED </a:t>
-            </a:r>
-            <a:r>
-              <a:rPr lang="en-US" sz="1600" b="1" dirty="0" smtClean="0">
-                <a:solidFill>
-                  <a:schemeClr val="accent6">
-                    <a:lumMod val="60000"/>
-                    <a:lumOff val="40000"/>
-                  </a:schemeClr>
-                </a:solidFill>
-                <a:latin typeface="Russo One" pitchFamily="2" charset="0"/>
-              </a:rPr>
-              <a:t>BY:</a:t>
-            </a:r>
-          </a:p>
-          <a:p>
-            <a:pPr>
-              <a:buNone/>
-            </a:pPr>
-            <a:r>
-              <a:rPr lang="en-US" sz="1600" b="1" dirty="0" smtClean="0">
-                <a:latin typeface="SansSerif" pitchFamily="2" charset="2"/>
-              </a:rPr>
-              <a:t>	</a:t>
-            </a:r>
-            <a:r>
-              <a:rPr lang="en-US" sz="1600" b="1" dirty="0" smtClean="0">
-                <a:latin typeface="SansSerif" pitchFamily="2" charset="2"/>
-              </a:rPr>
-              <a:t>	</a:t>
-            </a:r>
-            <a:r>
-              <a:rPr lang="en-US" sz="1600" b="1" dirty="0" smtClean="0">
-                <a:solidFill>
-                  <a:schemeClr val="tx2">
-                    <a:lumMod val="50000"/>
-                  </a:schemeClr>
-                </a:solidFill>
-                <a:latin typeface="SansSerif" pitchFamily="2" charset="2"/>
-              </a:rPr>
-              <a:t>Dr. S. Sivaganesan </a:t>
-            </a:r>
-            <a:r>
-              <a:rPr lang="en-US" sz="1600" b="1" dirty="0" smtClean="0">
-                <a:solidFill>
-                  <a:schemeClr val="tx1">
-                    <a:lumMod val="65000"/>
-                    <a:lumOff val="35000"/>
-                  </a:schemeClr>
-                </a:solidFill>
-                <a:latin typeface="SansSerif" pitchFamily="2" charset="2"/>
+                <a:latin typeface="Rockwell Condensed" pitchFamily="18" charset="0"/>
               </a:rPr>
               <a:t>(Ass. HOD)</a:t>
             </a:r>
@@ -4639,7 +4579,7 @@
             <a:pPr>
               <a:buNone/>
             </a:pPr>
-            <a:endParaRPr lang="en-US" sz="1200" dirty="0"/>
+            <a:endParaRPr lang="en-US" sz="1800" dirty="0"/>
           </a:p>
         </p:txBody>
       </p:sp>
@@ -4742,19 +4682,7 @@
                 </a:solidFill>
                 <a:latin typeface="Russo One" pitchFamily="2" charset="0"/>
               </a:rPr>
-              <a:t>ABSTRACT </a:t>
-            </a:r>
-            <a:r>
-              <a:rPr lang="en-US" sz="2400" b="1" dirty="0" smtClean="0">
-                <a:solidFill>
-                  <a:schemeClr val="accent6">
-                    <a:lumMod val="60000"/>
-                    <a:lumOff val="40000"/>
-                  </a:schemeClr>
-                </a:solidFill>
-                <a:latin typeface="Russo One" pitchFamily="2" charset="0"/>
-              </a:rPr>
-              <a:t>:</a:t>
+              <a:t>ABSTRACT :</a:t>
             </a:r>
             <a:endParaRPr lang="en-US" sz="2400" dirty="0">
               <a:solidFill>

</xml_diff>

<commit_message>
Update - 5 NK 87
</commit_message>
<xml_diff>
--- a/AS-GPS & EMBS.pptx
+++ b/AS-GPS & EMBS.pptx
@@ -4337,7 +4337,7 @@
         <p:spPr>
           <a:xfrm>
             <a:off x="457200" y="1905000"/>
-            <a:ext cx="8229600" cy="2514600"/>
+            <a:ext cx="8229600" cy="2667000"/>
           </a:xfrm>
         </p:spPr>
         <p:txBody>
@@ -4538,8 +4538,29 @@
                 </a:solidFill>
                 <a:latin typeface="Russo One" pitchFamily="2" charset="0"/>
               </a:rPr>
-              <a:t>GUIDED BY:</a:t>
-            </a:r>
+              <a:t>GUIDED </a:t>
+            </a:r>
+            <a:r>
+              <a:rPr lang="en-US" sz="1800" b="1" dirty="0" smtClean="0">
+                <a:solidFill>
+                  <a:schemeClr val="accent6">
+                    <a:lumMod val="60000"/>
+                    <a:lumOff val="40000"/>
+                  </a:schemeClr>
+                </a:solidFill>
+                <a:latin typeface="Russo One" pitchFamily="2" charset="0"/>
+              </a:rPr>
+              <a:t>BY :</a:t>
+            </a:r>
+            <a:endParaRPr lang="en-US" sz="1800" b="1" dirty="0" smtClean="0">
+              <a:solidFill>
+                <a:schemeClr val="accent6">
+                  <a:lumMod val="60000"/>
+                  <a:lumOff val="40000"/>
+                </a:schemeClr>
+              </a:solidFill>
+              <a:latin typeface="Russo One" pitchFamily="2" charset="0"/>
+            </a:endParaRPr>
           </a:p>
           <a:p>
             <a:pPr>

</xml_diff>